<commit_message>
update powerpoint add getting started section
</commit_message>
<xml_diff>
--- a/RustyWebApp.pptx
+++ b/RustyWebApp.pptx
@@ -6,13 +6,14 @@
     <p:sldMasterId id="2147483660" r:id="rId2"/>
   </p:sldMasterIdLst>
   <p:notesMasterIdLst>
-    <p:notesMasterId r:id="rId7"/>
+    <p:notesMasterId r:id="rId8"/>
   </p:notesMasterIdLst>
   <p:sldIdLst>
     <p:sldId id="265" r:id="rId3"/>
     <p:sldId id="268" r:id="rId4"/>
     <p:sldId id="269" r:id="rId5"/>
     <p:sldId id="272" r:id="rId6"/>
+    <p:sldId id="274" r:id="rId7"/>
   </p:sldIdLst>
   <p:sldSz cx="12192000" cy="6858000"/>
   <p:notesSz cx="6858000" cy="9144000"/>
@@ -111,6 +112,11 @@
       </a:defRPr>
     </a:lvl9pPr>
   </p:defaultTextStyle>
+  <p:extLst>
+    <p:ext uri="{EFAFB233-063F-42B5-8137-9DF3F51BA10A}">
+      <p15:sldGuideLst xmlns:p15="http://schemas.microsoft.com/office/powerpoint/2012/main"/>
+    </p:ext>
+  </p:extLst>
 </p:presentation>
 </file>
 
@@ -196,7 +202,7 @@
           <a:p>
             <a:fld id="{40B385F9-7CCB-4CF0-840B-3650F1341530}" type="datetimeFigureOut">
               <a:rPr lang="en-US" smtClean="0"/>
-              <a:t>8/26/2020</a:t>
+              <a:t>9/30/2020</a:t>
             </a:fld>
             <a:endParaRPr lang="en-US"/>
           </a:p>
@@ -694,7 +700,7 @@
           <a:p>
             <a:fld id="{C2B9FE97-0DC1-4DA3-AF69-E9516AC0CBF9}" type="datetimeFigureOut">
               <a:rPr lang="en-US" smtClean="0"/>
-              <a:t>8/26/2020</a:t>
+              <a:t>9/30/2020</a:t>
             </a:fld>
             <a:endParaRPr lang="en-US"/>
           </a:p>
@@ -892,7 +898,7 @@
           <a:p>
             <a:fld id="{C2B9FE97-0DC1-4DA3-AF69-E9516AC0CBF9}" type="datetimeFigureOut">
               <a:rPr lang="en-US" smtClean="0"/>
-              <a:t>8/26/2020</a:t>
+              <a:t>9/30/2020</a:t>
             </a:fld>
             <a:endParaRPr lang="en-US"/>
           </a:p>
@@ -1100,7 +1106,7 @@
           <a:p>
             <a:fld id="{C2B9FE97-0DC1-4DA3-AF69-E9516AC0CBF9}" type="datetimeFigureOut">
               <a:rPr lang="en-US" smtClean="0"/>
-              <a:t>8/26/2020</a:t>
+              <a:t>9/30/2020</a:t>
             </a:fld>
             <a:endParaRPr lang="en-US"/>
           </a:p>
@@ -1320,7 +1326,7 @@
           <a:p>
             <a:fld id="{2BE63B19-0516-4569-B712-8EC5C5FC73D7}" type="datetime1">
               <a:rPr lang="en-US" smtClean="0"/>
-              <a:t>8/26/2020</a:t>
+              <a:t>9/30/2020</a:t>
             </a:fld>
             <a:endParaRPr lang="en-US"/>
           </a:p>
@@ -1521,7 +1527,7 @@
           <a:p>
             <a:fld id="{36AE9653-09A4-4A1A-86A2-22EA13F9AAFB}" type="datetime1">
               <a:rPr lang="en-US" smtClean="0"/>
-              <a:t>8/26/2020</a:t>
+              <a:t>9/30/2020</a:t>
             </a:fld>
             <a:endParaRPr lang="en-US"/>
           </a:p>
@@ -1799,7 +1805,7 @@
           <a:p>
             <a:fld id="{FCC1FEA8-435A-48E4-9E4C-E82C791266DE}" type="datetime1">
               <a:rPr lang="en-US" smtClean="0"/>
-              <a:t>8/26/2020</a:t>
+              <a:t>9/30/2020</a:t>
             </a:fld>
             <a:endParaRPr lang="en-US"/>
           </a:p>
@@ -2067,7 +2073,7 @@
           <a:p>
             <a:fld id="{9769E967-A411-4969-B358-58EEDD1723EE}" type="datetime1">
               <a:rPr lang="en-US" smtClean="0"/>
-              <a:t>8/26/2020</a:t>
+              <a:t>9/30/2020</a:t>
             </a:fld>
             <a:endParaRPr lang="en-US"/>
           </a:p>
@@ -2482,7 +2488,7 @@
           <a:p>
             <a:fld id="{26CF9157-5643-4813-B559-CF3A43EAA586}" type="datetime1">
               <a:rPr lang="en-US" smtClean="0"/>
-              <a:t>8/26/2020</a:t>
+              <a:t>9/30/2020</a:t>
             </a:fld>
             <a:endParaRPr lang="en-US"/>
           </a:p>
@@ -2626,7 +2632,7 @@
           <a:p>
             <a:fld id="{E5091FD3-9EDF-4236-9615-03497DEC2F25}" type="datetime1">
               <a:rPr lang="en-US" smtClean="0"/>
-              <a:t>8/26/2020</a:t>
+              <a:t>9/30/2020</a:t>
             </a:fld>
             <a:endParaRPr lang="en-US"/>
           </a:p>
@@ -2742,7 +2748,7 @@
           <a:p>
             <a:fld id="{FD6AEB59-C6D9-473C-94BA-47DA9C5809A3}" type="datetime1">
               <a:rPr lang="en-US" smtClean="0"/>
-              <a:t>8/26/2020</a:t>
+              <a:t>9/30/2020</a:t>
             </a:fld>
             <a:endParaRPr lang="en-US"/>
           </a:p>
@@ -3056,7 +3062,7 @@
           <a:p>
             <a:fld id="{9FFF7D38-572C-4D10-80C7-509477EF5803}" type="datetime1">
               <a:rPr lang="en-US" smtClean="0"/>
-              <a:t>8/26/2020</a:t>
+              <a:t>9/30/2020</a:t>
             </a:fld>
             <a:endParaRPr lang="en-US"/>
           </a:p>
@@ -3257,7 +3263,7 @@
           <a:p>
             <a:fld id="{C2B9FE97-0DC1-4DA3-AF69-E9516AC0CBF9}" type="datetimeFigureOut">
               <a:rPr lang="en-US" smtClean="0"/>
-              <a:t>8/26/2020</a:t>
+              <a:t>9/30/2020</a:t>
             </a:fld>
             <a:endParaRPr lang="en-US"/>
           </a:p>
@@ -3545,7 +3551,7 @@
           <a:p>
             <a:fld id="{63251C4F-8DAA-445A-9204-38B149BE527B}" type="datetime1">
               <a:rPr lang="en-US" smtClean="0"/>
-              <a:t>8/26/2020</a:t>
+              <a:t>9/30/2020</a:t>
             </a:fld>
             <a:endParaRPr lang="en-US"/>
           </a:p>
@@ -3746,7 +3752,7 @@
           <a:p>
             <a:fld id="{43868FD8-0AD7-4E1F-9181-3C53BA169C86}" type="datetime1">
               <a:rPr lang="en-US" smtClean="0"/>
-              <a:t>8/26/2020</a:t>
+              <a:t>9/30/2020</a:t>
             </a:fld>
             <a:endParaRPr lang="en-US"/>
           </a:p>
@@ -3957,7 +3963,7 @@
           <a:p>
             <a:fld id="{8ABE26B9-926F-4C00-8E0D-BB88A26F3D37}" type="datetime1">
               <a:rPr lang="en-US" smtClean="0"/>
-              <a:t>8/26/2020</a:t>
+              <a:t>9/30/2020</a:t>
             </a:fld>
             <a:endParaRPr lang="en-US"/>
           </a:p>
@@ -4235,7 +4241,7 @@
           <a:p>
             <a:fld id="{C2B9FE97-0DC1-4DA3-AF69-E9516AC0CBF9}" type="datetimeFigureOut">
               <a:rPr lang="en-US" smtClean="0"/>
-              <a:t>8/26/2020</a:t>
+              <a:t>9/30/2020</a:t>
             </a:fld>
             <a:endParaRPr lang="en-US"/>
           </a:p>
@@ -4500,7 +4506,7 @@
           <a:p>
             <a:fld id="{C2B9FE97-0DC1-4DA3-AF69-E9516AC0CBF9}" type="datetimeFigureOut">
               <a:rPr lang="en-US" smtClean="0"/>
-              <a:t>8/26/2020</a:t>
+              <a:t>9/30/2020</a:t>
             </a:fld>
             <a:endParaRPr lang="en-US"/>
           </a:p>
@@ -4912,7 +4918,7 @@
           <a:p>
             <a:fld id="{C2B9FE97-0DC1-4DA3-AF69-E9516AC0CBF9}" type="datetimeFigureOut">
               <a:rPr lang="en-US" smtClean="0"/>
-              <a:t>8/26/2020</a:t>
+              <a:t>9/30/2020</a:t>
             </a:fld>
             <a:endParaRPr lang="en-US"/>
           </a:p>
@@ -5053,7 +5059,7 @@
           <a:p>
             <a:fld id="{C2B9FE97-0DC1-4DA3-AF69-E9516AC0CBF9}" type="datetimeFigureOut">
               <a:rPr lang="en-US" smtClean="0"/>
-              <a:t>8/26/2020</a:t>
+              <a:t>9/30/2020</a:t>
             </a:fld>
             <a:endParaRPr lang="en-US"/>
           </a:p>
@@ -5166,7 +5172,7 @@
           <a:p>
             <a:fld id="{C2B9FE97-0DC1-4DA3-AF69-E9516AC0CBF9}" type="datetimeFigureOut">
               <a:rPr lang="en-US" smtClean="0"/>
-              <a:t>8/26/2020</a:t>
+              <a:t>9/30/2020</a:t>
             </a:fld>
             <a:endParaRPr lang="en-US"/>
           </a:p>
@@ -5477,7 +5483,7 @@
           <a:p>
             <a:fld id="{C2B9FE97-0DC1-4DA3-AF69-E9516AC0CBF9}" type="datetimeFigureOut">
               <a:rPr lang="en-US" smtClean="0"/>
-              <a:t>8/26/2020</a:t>
+              <a:t>9/30/2020</a:t>
             </a:fld>
             <a:endParaRPr lang="en-US"/>
           </a:p>
@@ -5765,7 +5771,7 @@
           <a:p>
             <a:fld id="{C2B9FE97-0DC1-4DA3-AF69-E9516AC0CBF9}" type="datetimeFigureOut">
               <a:rPr lang="en-US" smtClean="0"/>
-              <a:t>8/26/2020</a:t>
+              <a:t>9/30/2020</a:t>
             </a:fld>
             <a:endParaRPr lang="en-US"/>
           </a:p>
@@ -6006,7 +6012,7 @@
           <a:p>
             <a:fld id="{C2B9FE97-0DC1-4DA3-AF69-E9516AC0CBF9}" type="datetimeFigureOut">
               <a:rPr lang="en-US" smtClean="0"/>
-              <a:t>8/26/2020</a:t>
+              <a:t>9/30/2020</a:t>
             </a:fld>
             <a:endParaRPr lang="en-US"/>
           </a:p>
@@ -6574,7 +6580,7 @@
           <a:p>
             <a:fld id="{9C53D9E6-3555-485D-B762-D68C9D979839}" type="datetime1">
               <a:rPr lang="en-US" smtClean="0"/>
-              <a:t>8/26/2020</a:t>
+              <a:t>9/30/2020</a:t>
             </a:fld>
             <a:endParaRPr lang="en-US"/>
           </a:p>
@@ -9194,6 +9200,946 @@
     <p:extLst>
       <p:ext uri="{BB962C8B-B14F-4D97-AF65-F5344CB8AC3E}">
         <p14:creationId xmlns:p14="http://schemas.microsoft.com/office/powerpoint/2010/main" val="2674732939"/>
+      </p:ext>
+    </p:extLst>
+  </p:cSld>
+  <p:clrMapOvr>
+    <a:overrideClrMapping bg1="dk1" tx1="lt1" bg2="dk2" tx2="lt2" accent1="accent1" accent2="accent2" accent3="accent3" accent4="accent4" accent5="accent5" accent6="accent6" hlink="hlink" folHlink="folHlink"/>
+  </p:clrMapOvr>
+</p:sld>
+</file>
+
+<file path=ppt/slides/slide5.xml><?xml version="1.0" encoding="utf-8"?>
+<p:sld xmlns:a="http://schemas.openxmlformats.org/drawingml/2006/main" xmlns:r="http://schemas.openxmlformats.org/officeDocument/2006/relationships" xmlns:p="http://schemas.openxmlformats.org/presentationml/2006/main">
+  <p:cSld>
+    <p:bg>
+      <p:bgPr>
+        <a:solidFill>
+          <a:schemeClr val="bg1">
+            <a:tint val="95000"/>
+            <a:satMod val="170000"/>
+          </a:schemeClr>
+        </a:solidFill>
+        <a:effectLst/>
+      </p:bgPr>
+    </p:bg>
+    <p:spTree>
+      <p:nvGrpSpPr>
+        <p:cNvPr id="1" name=""/>
+        <p:cNvGrpSpPr/>
+        <p:nvPr/>
+      </p:nvGrpSpPr>
+      <p:grpSpPr>
+        <a:xfrm>
+          <a:off x="0" y="0"/>
+          <a:ext cx="0" cy="0"/>
+          <a:chOff x="0" y="0"/>
+          <a:chExt cx="0" cy="0"/>
+        </a:xfrm>
+      </p:grpSpPr>
+      <p:sp>
+        <p:nvSpPr>
+          <p:cNvPr id="2" name="Title 1">
+            <a:extLst>
+              <a:ext uri="{FF2B5EF4-FFF2-40B4-BE49-F238E27FC236}">
+                <a16:creationId xmlns:a16="http://schemas.microsoft.com/office/drawing/2014/main" id="{921BF615-EC68-49E7-8172-28DA2E86745C}"/>
+              </a:ext>
+            </a:extLst>
+          </p:cNvPr>
+          <p:cNvSpPr>
+            <a:spLocks noGrp="1"/>
+          </p:cNvSpPr>
+          <p:nvPr>
+            <p:ph type="title"/>
+          </p:nvPr>
+        </p:nvSpPr>
+        <p:spPr>
+          <a:xfrm>
+            <a:off x="804673" y="1445494"/>
+            <a:ext cx="3616856" cy="4376572"/>
+          </a:xfrm>
+        </p:spPr>
+        <p:txBody>
+          <a:bodyPr anchor="ctr">
+            <a:normAutofit/>
+          </a:bodyPr>
+          <a:lstStyle/>
+          <a:p>
+            <a:br>
+              <a:rPr lang="en-US" sz="4800" dirty="0"/>
+            </a:br>
+            <a:endParaRPr lang="en-US" sz="4800" dirty="0"/>
+          </a:p>
+        </p:txBody>
+      </p:sp>
+      <p:sp>
+        <p:nvSpPr>
+          <p:cNvPr id="18" name="Freeform: Shape 17">
+            <a:extLst>
+              <a:ext uri="{FF2B5EF4-FFF2-40B4-BE49-F238E27FC236}">
+                <a16:creationId xmlns:a16="http://schemas.microsoft.com/office/drawing/2014/main" id="{DFF2AC85-FAA0-4844-813F-83C04D7382E2}"/>
+              </a:ext>
+              <a:ext uri="{C183D7F6-B498-43B3-948B-1728B52AA6E4}">
+                <adec:decorative xmlns:adec="http://schemas.microsoft.com/office/drawing/2017/decorative" val="1"/>
+              </a:ext>
+            </a:extLst>
+          </p:cNvPr>
+          <p:cNvSpPr>
+            <a:spLocks noGrp="1" noRot="1" noChangeAspect="1" noMove="1" noResize="1" noEditPoints="1" noAdjustHandles="1" noChangeArrowheads="1" noChangeShapeType="1" noTextEdit="1"/>
+          </p:cNvSpPr>
+          <p:nvPr>
+            <p:extLst>
+              <p:ext uri="{386F3935-93C4-4BCD-93E2-E3B085C9AB24}">
+                <p16:designElem xmlns:p16="http://schemas.microsoft.com/office/powerpoint/2015/main" val="1"/>
+              </p:ext>
+            </p:extLst>
+          </p:nvPr>
+        </p:nvSpPr>
+        <p:spPr>
+          <a:xfrm>
+            <a:off x="4907636" y="0"/>
+            <a:ext cx="7281316" cy="6858000"/>
+          </a:xfrm>
+          <a:custGeom>
+            <a:avLst/>
+            <a:gdLst>
+              <a:gd name="connsiteX0" fmla="*/ 361354 w 7281316"/>
+              <a:gd name="connsiteY0" fmla="*/ 0 h 6858000"/>
+              <a:gd name="connsiteX1" fmla="*/ 7281316 w 7281316"/>
+              <a:gd name="connsiteY1" fmla="*/ 0 h 6858000"/>
+              <a:gd name="connsiteX2" fmla="*/ 7281316 w 7281316"/>
+              <a:gd name="connsiteY2" fmla="*/ 6858000 h 6858000"/>
+              <a:gd name="connsiteX3" fmla="*/ 696735 w 7281316"/>
+              <a:gd name="connsiteY3" fmla="*/ 6858000 h 6858000"/>
+              <a:gd name="connsiteX4" fmla="*/ 690849 w 7281316"/>
+              <a:gd name="connsiteY4" fmla="*/ 6842426 h 6858000"/>
+              <a:gd name="connsiteX5" fmla="*/ 335637 w 7281316"/>
+              <a:gd name="connsiteY5" fmla="*/ 94722 h 6858000"/>
+            </a:gdLst>
+            <a:ahLst/>
+            <a:cxnLst>
+              <a:cxn ang="0">
+                <a:pos x="connsiteX0" y="connsiteY0"/>
+              </a:cxn>
+              <a:cxn ang="0">
+                <a:pos x="connsiteX1" y="connsiteY1"/>
+              </a:cxn>
+              <a:cxn ang="0">
+                <a:pos x="connsiteX2" y="connsiteY2"/>
+              </a:cxn>
+              <a:cxn ang="0">
+                <a:pos x="connsiteX3" y="connsiteY3"/>
+              </a:cxn>
+              <a:cxn ang="0">
+                <a:pos x="connsiteX4" y="connsiteY4"/>
+              </a:cxn>
+              <a:cxn ang="0">
+                <a:pos x="connsiteX5" y="connsiteY5"/>
+              </a:cxn>
+            </a:cxnLst>
+            <a:rect l="l" t="t" r="r" b="b"/>
+            <a:pathLst>
+              <a:path w="7281316" h="6858000">
+                <a:moveTo>
+                  <a:pt x="361354" y="0"/>
+                </a:moveTo>
+                <a:lnTo>
+                  <a:pt x="7281316" y="0"/>
+                </a:lnTo>
+                <a:lnTo>
+                  <a:pt x="7281316" y="6858000"/>
+                </a:lnTo>
+                <a:lnTo>
+                  <a:pt x="696735" y="6858000"/>
+                </a:lnTo>
+                <a:lnTo>
+                  <a:pt x="690849" y="6842426"/>
+                </a:lnTo>
+                <a:cubicBezTo>
+                  <a:pt x="-65870" y="4704140"/>
+                  <a:pt x="-226206" y="2374054"/>
+                  <a:pt x="335637" y="94722"/>
+                </a:cubicBezTo>
+                <a:close/>
+              </a:path>
+            </a:pathLst>
+          </a:custGeom>
+          <a:solidFill>
+            <a:schemeClr val="tx1">
+              <a:alpha val="80000"/>
+            </a:schemeClr>
+          </a:solidFill>
+          <a:ln>
+            <a:noFill/>
+          </a:ln>
+        </p:spPr>
+        <p:style>
+          <a:lnRef idx="2">
+            <a:schemeClr val="accent1">
+              <a:shade val="50000"/>
+            </a:schemeClr>
+          </a:lnRef>
+          <a:fillRef idx="1">
+            <a:schemeClr val="accent1"/>
+          </a:fillRef>
+          <a:effectRef idx="0">
+            <a:schemeClr val="accent1"/>
+          </a:effectRef>
+          <a:fontRef idx="minor">
+            <a:schemeClr val="lt1"/>
+          </a:fontRef>
+        </p:style>
+        <p:txBody>
+          <a:bodyPr rtlCol="0" anchor="ctr"/>
+          <a:lstStyle/>
+          <a:p>
+            <a:pPr marL="0" marR="0" lvl="0" indent="0" algn="ctr" defTabSz="914400" rtl="0" eaLnBrk="1" fontAlgn="auto" latinLnBrk="0" hangingPunct="1">
+              <a:lnSpc>
+                <a:spcPct val="100000"/>
+              </a:lnSpc>
+              <a:spcBef>
+                <a:spcPts val="0"/>
+              </a:spcBef>
+              <a:spcAft>
+                <a:spcPts val="0"/>
+              </a:spcAft>
+              <a:buClrTx/>
+              <a:buSzTx/>
+              <a:buFontTx/>
+              <a:buNone/>
+              <a:tabLst/>
+              <a:defRPr/>
+            </a:pPr>
+            <a:endParaRPr kumimoji="0" lang="en-US" sz="1800" b="0" i="0" u="none" strike="noStrike" kern="1200" cap="none" spc="0" normalizeH="0" baseline="0" noProof="0">
+              <a:ln>
+                <a:noFill/>
+              </a:ln>
+              <a:solidFill>
+                <a:prstClr val="white"/>
+              </a:solidFill>
+              <a:effectLst/>
+              <a:uLnTx/>
+              <a:uFillTx/>
+              <a:latin typeface="Calibri" panose="020F0502020204030204"/>
+              <a:ea typeface="+mn-ea"/>
+              <a:cs typeface="+mn-cs"/>
+            </a:endParaRPr>
+          </a:p>
+        </p:txBody>
+      </p:sp>
+      <p:sp>
+        <p:nvSpPr>
+          <p:cNvPr id="20" name="Freeform: Shape 19">
+            <a:extLst>
+              <a:ext uri="{FF2B5EF4-FFF2-40B4-BE49-F238E27FC236}">
+                <a16:creationId xmlns:a16="http://schemas.microsoft.com/office/drawing/2014/main" id="{89CC0F1E-BAA2-47B1-8F83-7ECB9FD9E009}"/>
+              </a:ext>
+              <a:ext uri="{C183D7F6-B498-43B3-948B-1728B52AA6E4}">
+                <adec:decorative xmlns:adec="http://schemas.microsoft.com/office/drawing/2017/decorative" val="1"/>
+              </a:ext>
+            </a:extLst>
+          </p:cNvPr>
+          <p:cNvSpPr>
+            <a:spLocks noGrp="1" noRot="1" noChangeAspect="1" noMove="1" noResize="1" noEditPoints="1" noAdjustHandles="1" noChangeArrowheads="1" noChangeShapeType="1" noTextEdit="1"/>
+          </p:cNvSpPr>
+          <p:nvPr>
+            <p:extLst>
+              <p:ext uri="{386F3935-93C4-4BCD-93E2-E3B085C9AB24}">
+                <p16:designElem xmlns:p16="http://schemas.microsoft.com/office/powerpoint/2015/main" val="1"/>
+              </p:ext>
+            </p:extLst>
+          </p:nvPr>
+        </p:nvSpPr>
+        <p:spPr>
+          <a:xfrm>
+            <a:off x="5189558" y="0"/>
+            <a:ext cx="6999394" cy="6858000"/>
+          </a:xfrm>
+          <a:custGeom>
+            <a:avLst/>
+            <a:gdLst>
+              <a:gd name="connsiteX0" fmla="*/ 6999394 w 6999394"/>
+              <a:gd name="connsiteY0" fmla="*/ 0 h 6858000"/>
+              <a:gd name="connsiteX1" fmla="*/ 6999394 w 6999394"/>
+              <a:gd name="connsiteY1" fmla="*/ 6858000 h 6858000"/>
+              <a:gd name="connsiteX2" fmla="*/ 717029 w 6999394"/>
+              <a:gd name="connsiteY2" fmla="*/ 6858000 h 6858000"/>
+              <a:gd name="connsiteX3" fmla="*/ 623642 w 6999394"/>
+              <a:gd name="connsiteY3" fmla="*/ 6599363 h 6858000"/>
+              <a:gd name="connsiteX4" fmla="*/ 319533 w 6999394"/>
+              <a:gd name="connsiteY4" fmla="*/ 193787 h 6858000"/>
+              <a:gd name="connsiteX5" fmla="*/ 371685 w 6999394"/>
+              <a:gd name="connsiteY5" fmla="*/ 1 h 6858000"/>
+            </a:gdLst>
+            <a:ahLst/>
+            <a:cxnLst>
+              <a:cxn ang="0">
+                <a:pos x="connsiteX0" y="connsiteY0"/>
+              </a:cxn>
+              <a:cxn ang="0">
+                <a:pos x="connsiteX1" y="connsiteY1"/>
+              </a:cxn>
+              <a:cxn ang="0">
+                <a:pos x="connsiteX2" y="connsiteY2"/>
+              </a:cxn>
+              <a:cxn ang="0">
+                <a:pos x="connsiteX3" y="connsiteY3"/>
+              </a:cxn>
+              <a:cxn ang="0">
+                <a:pos x="connsiteX4" y="connsiteY4"/>
+              </a:cxn>
+              <a:cxn ang="0">
+                <a:pos x="connsiteX5" y="connsiteY5"/>
+              </a:cxn>
+            </a:cxnLst>
+            <a:rect l="l" t="t" r="r" b="b"/>
+            <a:pathLst>
+              <a:path w="6999394" h="6858000">
+                <a:moveTo>
+                  <a:pt x="6999394" y="0"/>
+                </a:moveTo>
+                <a:lnTo>
+                  <a:pt x="6999394" y="6858000"/>
+                </a:lnTo>
+                <a:lnTo>
+                  <a:pt x="717029" y="6858000"/>
+                </a:lnTo>
+                <a:lnTo>
+                  <a:pt x="623642" y="6599363"/>
+                </a:lnTo>
+                <a:cubicBezTo>
+                  <a:pt x="-67685" y="4563346"/>
+                  <a:pt x="-206622" y="2355719"/>
+                  <a:pt x="319533" y="193787"/>
+                </a:cubicBezTo>
+                <a:lnTo>
+                  <a:pt x="371685" y="1"/>
+                </a:lnTo>
+                <a:close/>
+              </a:path>
+            </a:pathLst>
+          </a:custGeom>
+          <a:solidFill>
+            <a:schemeClr val="tx1">
+              <a:alpha val="80000"/>
+            </a:schemeClr>
+          </a:solidFill>
+          <a:ln>
+            <a:noFill/>
+          </a:ln>
+        </p:spPr>
+        <p:style>
+          <a:lnRef idx="2">
+            <a:schemeClr val="accent1">
+              <a:shade val="50000"/>
+            </a:schemeClr>
+          </a:lnRef>
+          <a:fillRef idx="1">
+            <a:schemeClr val="accent1"/>
+          </a:fillRef>
+          <a:effectRef idx="0">
+            <a:schemeClr val="accent1"/>
+          </a:effectRef>
+          <a:fontRef idx="minor">
+            <a:schemeClr val="lt1"/>
+          </a:fontRef>
+        </p:style>
+        <p:txBody>
+          <a:bodyPr rtlCol="0" anchor="ctr"/>
+          <a:lstStyle/>
+          <a:p>
+            <a:pPr marL="0" marR="0" lvl="0" indent="0" algn="ctr" defTabSz="914400" rtl="0" eaLnBrk="1" fontAlgn="auto" latinLnBrk="0" hangingPunct="1">
+              <a:lnSpc>
+                <a:spcPct val="100000"/>
+              </a:lnSpc>
+              <a:spcBef>
+                <a:spcPts val="0"/>
+              </a:spcBef>
+              <a:spcAft>
+                <a:spcPts val="0"/>
+              </a:spcAft>
+              <a:buClrTx/>
+              <a:buSzTx/>
+              <a:buFontTx/>
+              <a:buNone/>
+              <a:tabLst/>
+              <a:defRPr/>
+            </a:pPr>
+            <a:endParaRPr kumimoji="0" lang="en-US" sz="1800" b="0" i="0" u="none" strike="noStrike" kern="1200" cap="none" spc="0" normalizeH="0" baseline="0" noProof="0">
+              <a:ln>
+                <a:noFill/>
+              </a:ln>
+              <a:solidFill>
+                <a:prstClr val="white"/>
+              </a:solidFill>
+              <a:effectLst/>
+              <a:uLnTx/>
+              <a:uFillTx/>
+              <a:latin typeface="Calibri" panose="020F0502020204030204"/>
+              <a:ea typeface="+mn-ea"/>
+              <a:cs typeface="+mn-cs"/>
+            </a:endParaRPr>
+          </a:p>
+        </p:txBody>
+      </p:sp>
+      <p:sp>
+        <p:nvSpPr>
+          <p:cNvPr id="4" name="Footer Placeholder 3">
+            <a:extLst>
+              <a:ext uri="{FF2B5EF4-FFF2-40B4-BE49-F238E27FC236}">
+                <a16:creationId xmlns:a16="http://schemas.microsoft.com/office/drawing/2014/main" id="{9701DC47-3834-4A90-AF5B-DFA733B67898}"/>
+              </a:ext>
+            </a:extLst>
+          </p:cNvPr>
+          <p:cNvSpPr>
+            <a:spLocks noGrp="1"/>
+          </p:cNvSpPr>
+          <p:nvPr>
+            <p:ph type="ftr" sz="quarter" idx="11"/>
+          </p:nvPr>
+        </p:nvSpPr>
+        <p:spPr>
+          <a:xfrm>
+            <a:off x="462240" y="4176826"/>
+            <a:ext cx="4114800" cy="404326"/>
+          </a:xfrm>
+        </p:spPr>
+        <p:txBody>
+          <a:bodyPr/>
+          <a:lstStyle/>
+          <a:p>
+            <a:pPr marL="0" marR="0" lvl="0" indent="0" algn="ctr" defTabSz="914400" rtl="0" eaLnBrk="1" fontAlgn="auto" latinLnBrk="0" hangingPunct="1">
+              <a:lnSpc>
+                <a:spcPct val="100000"/>
+              </a:lnSpc>
+              <a:spcBef>
+                <a:spcPts val="0"/>
+              </a:spcBef>
+              <a:spcAft>
+                <a:spcPts val="0"/>
+              </a:spcAft>
+              <a:buClrTx/>
+              <a:buSzTx/>
+              <a:buFontTx/>
+              <a:buNone/>
+              <a:tabLst/>
+              <a:defRPr/>
+            </a:pPr>
+            <a:r>
+              <a:rPr kumimoji="0" lang="en-US" sz="1200" b="0" i="0" u="none" strike="noStrike" kern="1200" cap="none" spc="0" normalizeH="0" baseline="0" noProof="0" dirty="0">
+                <a:ln>
+                  <a:noFill/>
+                </a:ln>
+                <a:solidFill>
+                  <a:prstClr val="white">
+                    <a:tint val="75000"/>
+                  </a:prstClr>
+                </a:solidFill>
+                <a:effectLst/>
+                <a:uLnTx/>
+                <a:uFillTx/>
+                <a:latin typeface="Calibri" panose="020F0502020204030204"/>
+                <a:ea typeface="+mn-ea"/>
+                <a:cs typeface="+mn-cs"/>
+                <a:hlinkClick r:id="rId2"/>
+              </a:rPr>
+              <a:t>https://rocket.rs/v0.4/guide/getting-started/</a:t>
+            </a:r>
+            <a:endParaRPr kumimoji="0" lang="en-US" sz="1200" b="0" i="0" u="none" strike="noStrike" kern="1200" cap="none" spc="0" normalizeH="0" baseline="0" noProof="0" dirty="0">
+              <a:ln>
+                <a:noFill/>
+              </a:ln>
+              <a:solidFill>
+                <a:prstClr val="white">
+                  <a:tint val="75000"/>
+                </a:prstClr>
+              </a:solidFill>
+              <a:effectLst/>
+              <a:uLnTx/>
+              <a:uFillTx/>
+              <a:latin typeface="Calibri" panose="020F0502020204030204"/>
+              <a:ea typeface="+mn-ea"/>
+              <a:cs typeface="+mn-cs"/>
+            </a:endParaRPr>
+          </a:p>
+          <a:p>
+            <a:pPr marL="0" marR="0" lvl="0" indent="0" algn="ctr" defTabSz="914400" rtl="0" eaLnBrk="1" fontAlgn="auto" latinLnBrk="0" hangingPunct="1">
+              <a:lnSpc>
+                <a:spcPct val="100000"/>
+              </a:lnSpc>
+              <a:spcBef>
+                <a:spcPts val="0"/>
+              </a:spcBef>
+              <a:spcAft>
+                <a:spcPts val="0"/>
+              </a:spcAft>
+              <a:buClrTx/>
+              <a:buSzTx/>
+              <a:buFontTx/>
+              <a:buNone/>
+              <a:tabLst/>
+              <a:defRPr/>
+            </a:pPr>
+            <a:r>
+              <a:rPr lang="en-US" dirty="0">
+                <a:solidFill>
+                  <a:prstClr val="white">
+                    <a:tint val="75000"/>
+                  </a:prstClr>
+                </a:solidFill>
+                <a:latin typeface="Calibri" panose="020F0502020204030204"/>
+                <a:hlinkClick r:id="rId3"/>
+              </a:rPr>
+              <a:t>https://r</a:t>
+            </a:r>
+            <a:r>
+              <a:rPr kumimoji="0" lang="en-US" sz="1200" b="0" i="0" u="none" strike="noStrike" kern="1200" cap="none" spc="0" normalizeH="0" baseline="0" noProof="0" dirty="0">
+                <a:ln>
+                  <a:noFill/>
+                </a:ln>
+                <a:solidFill>
+                  <a:prstClr val="white">
+                    <a:tint val="75000"/>
+                  </a:prstClr>
+                </a:solidFill>
+                <a:effectLst/>
+                <a:uLnTx/>
+                <a:uFillTx/>
+                <a:latin typeface="Calibri" panose="020F0502020204030204"/>
+                <a:hlinkClick r:id="rId3"/>
+              </a:rPr>
+              <a:t>ustup.rs</a:t>
+            </a:r>
+            <a:endParaRPr kumimoji="0" lang="en-US" sz="1200" b="0" i="0" u="none" strike="noStrike" kern="1200" cap="none" spc="0" normalizeH="0" baseline="0" noProof="0" dirty="0">
+              <a:ln>
+                <a:noFill/>
+              </a:ln>
+              <a:solidFill>
+                <a:prstClr val="white">
+                  <a:tint val="75000"/>
+                </a:prstClr>
+              </a:solidFill>
+              <a:effectLst/>
+              <a:uLnTx/>
+              <a:uFillTx/>
+              <a:latin typeface="Calibri" panose="020F0502020204030204"/>
+              <a:ea typeface="+mn-ea"/>
+              <a:cs typeface="+mn-cs"/>
+            </a:endParaRPr>
+          </a:p>
+          <a:p>
+            <a:pPr marL="0" marR="0" lvl="0" indent="0" algn="ctr" defTabSz="914400" rtl="0" eaLnBrk="1" fontAlgn="auto" latinLnBrk="0" hangingPunct="1">
+              <a:lnSpc>
+                <a:spcPct val="100000"/>
+              </a:lnSpc>
+              <a:spcBef>
+                <a:spcPts val="0"/>
+              </a:spcBef>
+              <a:spcAft>
+                <a:spcPts val="0"/>
+              </a:spcAft>
+              <a:buClrTx/>
+              <a:buSzTx/>
+              <a:buFontTx/>
+              <a:buNone/>
+              <a:tabLst/>
+              <a:defRPr/>
+            </a:pPr>
+            <a:endParaRPr kumimoji="0" lang="en-US" sz="1200" b="0" i="0" u="none" strike="noStrike" kern="1200" cap="none" spc="0" normalizeH="0" baseline="0" noProof="0" dirty="0">
+              <a:ln>
+                <a:noFill/>
+              </a:ln>
+              <a:solidFill>
+                <a:prstClr val="white">
+                  <a:tint val="75000"/>
+                </a:prstClr>
+              </a:solidFill>
+              <a:effectLst/>
+              <a:uLnTx/>
+              <a:uFillTx/>
+              <a:latin typeface="Calibri" panose="020F0502020204030204"/>
+              <a:ea typeface="+mn-ea"/>
+              <a:cs typeface="+mn-cs"/>
+            </a:endParaRPr>
+          </a:p>
+        </p:txBody>
+      </p:sp>
+      <p:pic>
+        <p:nvPicPr>
+          <p:cNvPr id="1026" name="Picture 2" descr="3 Frameworks for Building APIs Using Rust | Nordic APIs |">
+            <a:extLst>
+              <a:ext uri="{FF2B5EF4-FFF2-40B4-BE49-F238E27FC236}">
+                <a16:creationId xmlns:a16="http://schemas.microsoft.com/office/drawing/2014/main" id="{172BE581-5368-4543-ABC0-B5EB0C3FA8EE}"/>
+              </a:ext>
+            </a:extLst>
+          </p:cNvPr>
+          <p:cNvPicPr>
+            <a:picLocks noGrp="1" noChangeAspect="1" noChangeArrowheads="1"/>
+          </p:cNvPicPr>
+          <p:nvPr>
+            <p:ph idx="1"/>
+          </p:nvPr>
+        </p:nvPicPr>
+        <p:blipFill>
+          <a:blip r:embed="rId4">
+            <a:extLst>
+              <a:ext uri="{28A0092B-C50C-407E-A947-70E740481C1C}">
+                <a14:useLocalDpi xmlns:a14="http://schemas.microsoft.com/office/drawing/2010/main" val="0"/>
+              </a:ext>
+            </a:extLst>
+          </a:blip>
+          <a:srcRect/>
+          <a:stretch>
+            <a:fillRect/>
+          </a:stretch>
+        </p:blipFill>
+        <p:spPr bwMode="auto">
+          <a:xfrm>
+            <a:off x="1099513" y="2157587"/>
+            <a:ext cx="2840253" cy="1770424"/>
+          </a:xfrm>
+          <a:prstGeom prst="rect">
+            <a:avLst/>
+          </a:prstGeom>
+          <a:noFill/>
+          <a:extLst>
+            <a:ext uri="{909E8E84-426E-40DD-AFC4-6F175D3DCCD1}">
+              <a14:hiddenFill xmlns:a14="http://schemas.microsoft.com/office/drawing/2010/main">
+                <a:solidFill>
+                  <a:srgbClr val="FFFFFF"/>
+                </a:solidFill>
+              </a14:hiddenFill>
+            </a:ext>
+          </a:extLst>
+        </p:spPr>
+      </p:pic>
+      <p:sp>
+        <p:nvSpPr>
+          <p:cNvPr id="9" name="TextBox 8">
+            <a:extLst>
+              <a:ext uri="{FF2B5EF4-FFF2-40B4-BE49-F238E27FC236}">
+                <a16:creationId xmlns:a16="http://schemas.microsoft.com/office/drawing/2014/main" id="{FC28D8D4-F9EF-4C74-8B15-923431820E98}"/>
+              </a:ext>
+            </a:extLst>
+          </p:cNvPr>
+          <p:cNvSpPr txBox="1"/>
+          <p:nvPr/>
+        </p:nvSpPr>
+        <p:spPr>
+          <a:xfrm>
+            <a:off x="5767283" y="382527"/>
+            <a:ext cx="5075853" cy="584775"/>
+          </a:xfrm>
+          <a:prstGeom prst="rect">
+            <a:avLst/>
+          </a:prstGeom>
+          <a:noFill/>
+        </p:spPr>
+        <p:txBody>
+          <a:bodyPr wrap="square">
+            <a:spAutoFit/>
+          </a:bodyPr>
+          <a:lstStyle/>
+          <a:p>
+            <a:pPr marL="0" marR="0" lvl="0" indent="0" algn="l" defTabSz="914400" rtl="0" eaLnBrk="1" fontAlgn="auto" latinLnBrk="0" hangingPunct="1">
+              <a:lnSpc>
+                <a:spcPct val="100000"/>
+              </a:lnSpc>
+              <a:spcBef>
+                <a:spcPts val="0"/>
+              </a:spcBef>
+              <a:spcAft>
+                <a:spcPts val="0"/>
+              </a:spcAft>
+              <a:buClrTx/>
+              <a:buSzTx/>
+              <a:buFontTx/>
+              <a:buNone/>
+              <a:tabLst/>
+              <a:defRPr/>
+            </a:pPr>
+            <a:r>
+              <a:rPr kumimoji="0" lang="en-US" sz="3200" b="0" i="0" u="none" strike="noStrike" kern="1200" cap="none" spc="0" normalizeH="0" baseline="0" noProof="0" dirty="0">
+                <a:ln>
+                  <a:noFill/>
+                </a:ln>
+                <a:solidFill>
+                  <a:prstClr val="black"/>
+                </a:solidFill>
+                <a:effectLst/>
+                <a:uLnTx/>
+                <a:uFillTx/>
+                <a:latin typeface="Calibri" panose="020F0502020204030204"/>
+                <a:ea typeface="+mn-ea"/>
+                <a:cs typeface="+mn-cs"/>
+              </a:rPr>
+              <a:t>Getting Started</a:t>
+            </a:r>
+          </a:p>
+        </p:txBody>
+      </p:sp>
+      <p:sp>
+        <p:nvSpPr>
+          <p:cNvPr id="15" name="TextBox 14">
+            <a:extLst>
+              <a:ext uri="{FF2B5EF4-FFF2-40B4-BE49-F238E27FC236}">
+                <a16:creationId xmlns:a16="http://schemas.microsoft.com/office/drawing/2014/main" id="{21EA875C-51F9-48DC-962A-824DE36973A6}"/>
+              </a:ext>
+            </a:extLst>
+          </p:cNvPr>
+          <p:cNvSpPr txBox="1"/>
+          <p:nvPr/>
+        </p:nvSpPr>
+        <p:spPr>
+          <a:xfrm>
+            <a:off x="5569919" y="1356247"/>
+            <a:ext cx="6096000" cy="923330"/>
+          </a:xfrm>
+          <a:prstGeom prst="rect">
+            <a:avLst/>
+          </a:prstGeom>
+          <a:noFill/>
+        </p:spPr>
+        <p:txBody>
+          <a:bodyPr wrap="square">
+            <a:spAutoFit/>
+          </a:bodyPr>
+          <a:lstStyle/>
+          <a:p>
+            <a:r>
+              <a:rPr lang="en-US" dirty="0">
+                <a:solidFill>
+                  <a:schemeClr val="bg1"/>
+                </a:solidFill>
+              </a:rPr>
+              <a:t>Make sure you have a nightly version of rust installed. A nightly </a:t>
+            </a:r>
+            <a:r>
+              <a:rPr lang="en-US" dirty="0" err="1">
+                <a:solidFill>
+                  <a:schemeClr val="bg1"/>
+                </a:solidFill>
+              </a:rPr>
+              <a:t>versUse</a:t>
+            </a:r>
+            <a:r>
+              <a:rPr lang="en-US" dirty="0">
+                <a:solidFill>
+                  <a:schemeClr val="bg1"/>
+                </a:solidFill>
+              </a:rPr>
+              <a:t> the installer </a:t>
+            </a:r>
+            <a:r>
+              <a:rPr lang="en-US" dirty="0" err="1">
+                <a:solidFill>
+                  <a:schemeClr val="bg1"/>
+                </a:solidFill>
+                <a:hlinkClick r:id="rId5" action="ppaction://hlinkfile"/>
+              </a:rPr>
+              <a:t>rustup</a:t>
+            </a:r>
+            <a:r>
+              <a:rPr lang="en-US" dirty="0">
+                <a:solidFill>
+                  <a:schemeClr val="bg1"/>
+                </a:solidFill>
+              </a:rPr>
+              <a:t> to configure the nightly version using the following commands:</a:t>
+            </a:r>
+          </a:p>
+        </p:txBody>
+      </p:sp>
+      <p:sp>
+        <p:nvSpPr>
+          <p:cNvPr id="17" name="TextBox 16">
+            <a:extLst>
+              <a:ext uri="{FF2B5EF4-FFF2-40B4-BE49-F238E27FC236}">
+                <a16:creationId xmlns:a16="http://schemas.microsoft.com/office/drawing/2014/main" id="{1BCB8F87-FAD8-4CB6-8DFC-2380FB361F97}"/>
+              </a:ext>
+            </a:extLst>
+          </p:cNvPr>
+          <p:cNvSpPr txBox="1"/>
+          <p:nvPr/>
+        </p:nvSpPr>
+        <p:spPr>
+          <a:xfrm>
+            <a:off x="5500294" y="3187920"/>
+            <a:ext cx="6096000" cy="369332"/>
+          </a:xfrm>
+          <a:prstGeom prst="rect">
+            <a:avLst/>
+          </a:prstGeom>
+          <a:noFill/>
+        </p:spPr>
+        <p:txBody>
+          <a:bodyPr wrap="square">
+            <a:spAutoFit/>
+          </a:bodyPr>
+          <a:lstStyle/>
+          <a:p>
+            <a:r>
+              <a:rPr lang="en-US" dirty="0">
+                <a:solidFill>
+                  <a:schemeClr val="bg1"/>
+                </a:solidFill>
+              </a:rPr>
+              <a:t>Then create a new Rocket app and navigate to its directory :</a:t>
+            </a:r>
+          </a:p>
+        </p:txBody>
+      </p:sp>
+      <p:sp>
+        <p:nvSpPr>
+          <p:cNvPr id="19" name="TextBox 18">
+            <a:extLst>
+              <a:ext uri="{FF2B5EF4-FFF2-40B4-BE49-F238E27FC236}">
+                <a16:creationId xmlns:a16="http://schemas.microsoft.com/office/drawing/2014/main" id="{CB99B744-C037-4D80-8340-CF5B4EE0F104}"/>
+              </a:ext>
+            </a:extLst>
+          </p:cNvPr>
+          <p:cNvSpPr txBox="1"/>
+          <p:nvPr/>
+        </p:nvSpPr>
+        <p:spPr>
+          <a:xfrm>
+            <a:off x="5641255" y="4673636"/>
+            <a:ext cx="6096000" cy="369332"/>
+          </a:xfrm>
+          <a:prstGeom prst="rect">
+            <a:avLst/>
+          </a:prstGeom>
+          <a:noFill/>
+        </p:spPr>
+        <p:txBody>
+          <a:bodyPr wrap="square">
+            <a:spAutoFit/>
+          </a:bodyPr>
+          <a:lstStyle/>
+          <a:p>
+            <a:r>
+              <a:rPr lang="en-US" dirty="0">
+                <a:solidFill>
+                  <a:schemeClr val="bg1"/>
+                </a:solidFill>
+              </a:rPr>
+              <a:t>Set the nightly version of Rust to be scoped locally:</a:t>
+            </a:r>
+          </a:p>
+        </p:txBody>
+      </p:sp>
+      <p:pic>
+        <p:nvPicPr>
+          <p:cNvPr id="16" name="Picture 15" descr="Text&#10;&#10;Description automatically generated">
+            <a:extLst>
+              <a:ext uri="{FF2B5EF4-FFF2-40B4-BE49-F238E27FC236}">
+                <a16:creationId xmlns:a16="http://schemas.microsoft.com/office/drawing/2014/main" id="{021920EE-4F6F-4AC4-ACE3-46E81FB91BD6}"/>
+              </a:ext>
+            </a:extLst>
+          </p:cNvPr>
+          <p:cNvPicPr>
+            <a:picLocks noChangeAspect="1"/>
+          </p:cNvPicPr>
+          <p:nvPr/>
+        </p:nvPicPr>
+        <p:blipFill>
+          <a:blip r:embed="rId6">
+            <a:extLst>
+              <a:ext uri="{28A0092B-C50C-407E-A947-70E740481C1C}">
+                <a14:useLocalDpi xmlns:a14="http://schemas.microsoft.com/office/drawing/2010/main" val="0"/>
+              </a:ext>
+            </a:extLst>
+          </a:blip>
+          <a:stretch>
+            <a:fillRect/>
+          </a:stretch>
+        </p:blipFill>
+        <p:spPr>
+          <a:xfrm>
+            <a:off x="6223148" y="5119417"/>
+            <a:ext cx="3877216" cy="514422"/>
+          </a:xfrm>
+          <a:prstGeom prst="rect">
+            <a:avLst/>
+          </a:prstGeom>
+        </p:spPr>
+      </p:pic>
+      <p:pic>
+        <p:nvPicPr>
+          <p:cNvPr id="22" name="Picture 21" descr="Text&#10;&#10;Description automatically generated">
+            <a:extLst>
+              <a:ext uri="{FF2B5EF4-FFF2-40B4-BE49-F238E27FC236}">
+                <a16:creationId xmlns:a16="http://schemas.microsoft.com/office/drawing/2014/main" id="{B9E1640E-461B-4663-91EA-9876C505930E}"/>
+              </a:ext>
+            </a:extLst>
+          </p:cNvPr>
+          <p:cNvPicPr>
+            <a:picLocks noChangeAspect="1"/>
+          </p:cNvPicPr>
+          <p:nvPr/>
+        </p:nvPicPr>
+        <p:blipFill>
+          <a:blip r:embed="rId7">
+            <a:extLst>
+              <a:ext uri="{28A0092B-C50C-407E-A947-70E740481C1C}">
+                <a14:useLocalDpi xmlns:a14="http://schemas.microsoft.com/office/drawing/2010/main" val="0"/>
+              </a:ext>
+            </a:extLst>
+          </a:blip>
+          <a:stretch>
+            <a:fillRect/>
+          </a:stretch>
+        </p:blipFill>
+        <p:spPr>
+          <a:xfrm>
+            <a:off x="5792991" y="2398303"/>
+            <a:ext cx="2391109" cy="523948"/>
+          </a:xfrm>
+          <a:prstGeom prst="rect">
+            <a:avLst/>
+          </a:prstGeom>
+        </p:spPr>
+      </p:pic>
+      <p:pic>
+        <p:nvPicPr>
+          <p:cNvPr id="28" name="Picture 27" descr="Text&#10;&#10;Description automatically generated">
+            <a:extLst>
+              <a:ext uri="{FF2B5EF4-FFF2-40B4-BE49-F238E27FC236}">
+                <a16:creationId xmlns:a16="http://schemas.microsoft.com/office/drawing/2014/main" id="{43B089AA-0921-4E88-9FAC-749409B11082}"/>
+              </a:ext>
+            </a:extLst>
+          </p:cNvPr>
+          <p:cNvPicPr>
+            <a:picLocks noChangeAspect="1"/>
+          </p:cNvPicPr>
+          <p:nvPr/>
+        </p:nvPicPr>
+        <p:blipFill>
+          <a:blip r:embed="rId8">
+            <a:extLst>
+              <a:ext uri="{28A0092B-C50C-407E-A947-70E740481C1C}">
+                <a14:useLocalDpi xmlns:a14="http://schemas.microsoft.com/office/drawing/2010/main" val="0"/>
+              </a:ext>
+            </a:extLst>
+          </a:blip>
+          <a:stretch>
+            <a:fillRect/>
+          </a:stretch>
+        </p:blipFill>
+        <p:spPr>
+          <a:xfrm>
+            <a:off x="5974251" y="3704851"/>
+            <a:ext cx="2715004" cy="628738"/>
+          </a:xfrm>
+          <a:prstGeom prst="rect">
+            <a:avLst/>
+          </a:prstGeom>
+        </p:spPr>
+      </p:pic>
+    </p:spTree>
+    <p:extLst>
+      <p:ext uri="{BB962C8B-B14F-4D97-AF65-F5344CB8AC3E}">
+        <p14:creationId xmlns:p14="http://schemas.microsoft.com/office/powerpoint/2010/main" val="3348026861"/>
       </p:ext>
     </p:extLst>
   </p:cSld>

</xml_diff>